<commit_message>
Minor edits to preprocess_pipeline figure
</commit_message>
<xml_diff>
--- a/temp/Process_Pipeline.pptx
+++ b/temp/Process_Pipeline.pptx
@@ -259,7 +259,7 @@
           <a:p>
             <a:fld id="{6E31BD94-6558-4DB3-A27C-93E2C63AE737}" type="datetimeFigureOut">
               <a:rPr lang="en-US" smtClean="0"/>
-              <a:t>6/26/2019</a:t>
+              <a:t>6/27/2019</a:t>
             </a:fld>
             <a:endParaRPr lang="en-US"/>
           </a:p>
@@ -457,7 +457,7 @@
           <a:p>
             <a:fld id="{6E31BD94-6558-4DB3-A27C-93E2C63AE737}" type="datetimeFigureOut">
               <a:rPr lang="en-US" smtClean="0"/>
-              <a:t>6/26/2019</a:t>
+              <a:t>6/27/2019</a:t>
             </a:fld>
             <a:endParaRPr lang="en-US"/>
           </a:p>
@@ -665,7 +665,7 @@
           <a:p>
             <a:fld id="{6E31BD94-6558-4DB3-A27C-93E2C63AE737}" type="datetimeFigureOut">
               <a:rPr lang="en-US" smtClean="0"/>
-              <a:t>6/26/2019</a:t>
+              <a:t>6/27/2019</a:t>
             </a:fld>
             <a:endParaRPr lang="en-US"/>
           </a:p>
@@ -863,7 +863,7 @@
           <a:p>
             <a:fld id="{6E31BD94-6558-4DB3-A27C-93E2C63AE737}" type="datetimeFigureOut">
               <a:rPr lang="en-US" smtClean="0"/>
-              <a:t>6/26/2019</a:t>
+              <a:t>6/27/2019</a:t>
             </a:fld>
             <a:endParaRPr lang="en-US"/>
           </a:p>
@@ -1138,7 +1138,7 @@
           <a:p>
             <a:fld id="{6E31BD94-6558-4DB3-A27C-93E2C63AE737}" type="datetimeFigureOut">
               <a:rPr lang="en-US" smtClean="0"/>
-              <a:t>6/26/2019</a:t>
+              <a:t>6/27/2019</a:t>
             </a:fld>
             <a:endParaRPr lang="en-US"/>
           </a:p>
@@ -1403,7 +1403,7 @@
           <a:p>
             <a:fld id="{6E31BD94-6558-4DB3-A27C-93E2C63AE737}" type="datetimeFigureOut">
               <a:rPr lang="en-US" smtClean="0"/>
-              <a:t>6/26/2019</a:t>
+              <a:t>6/27/2019</a:t>
             </a:fld>
             <a:endParaRPr lang="en-US"/>
           </a:p>
@@ -1815,7 +1815,7 @@
           <a:p>
             <a:fld id="{6E31BD94-6558-4DB3-A27C-93E2C63AE737}" type="datetimeFigureOut">
               <a:rPr lang="en-US" smtClean="0"/>
-              <a:t>6/26/2019</a:t>
+              <a:t>6/27/2019</a:t>
             </a:fld>
             <a:endParaRPr lang="en-US"/>
           </a:p>
@@ -1956,7 +1956,7 @@
           <a:p>
             <a:fld id="{6E31BD94-6558-4DB3-A27C-93E2C63AE737}" type="datetimeFigureOut">
               <a:rPr lang="en-US" smtClean="0"/>
-              <a:t>6/26/2019</a:t>
+              <a:t>6/27/2019</a:t>
             </a:fld>
             <a:endParaRPr lang="en-US"/>
           </a:p>
@@ -2069,7 +2069,7 @@
           <a:p>
             <a:fld id="{6E31BD94-6558-4DB3-A27C-93E2C63AE737}" type="datetimeFigureOut">
               <a:rPr lang="en-US" smtClean="0"/>
-              <a:t>6/26/2019</a:t>
+              <a:t>6/27/2019</a:t>
             </a:fld>
             <a:endParaRPr lang="en-US"/>
           </a:p>
@@ -2380,7 +2380,7 @@
           <a:p>
             <a:fld id="{6E31BD94-6558-4DB3-A27C-93E2C63AE737}" type="datetimeFigureOut">
               <a:rPr lang="en-US" smtClean="0"/>
-              <a:t>6/26/2019</a:t>
+              <a:t>6/27/2019</a:t>
             </a:fld>
             <a:endParaRPr lang="en-US"/>
           </a:p>
@@ -2668,7 +2668,7 @@
           <a:p>
             <a:fld id="{6E31BD94-6558-4DB3-A27C-93E2C63AE737}" type="datetimeFigureOut">
               <a:rPr lang="en-US" smtClean="0"/>
-              <a:t>6/26/2019</a:t>
+              <a:t>6/27/2019</a:t>
             </a:fld>
             <a:endParaRPr lang="en-US"/>
           </a:p>
@@ -2909,7 +2909,7 @@
           <a:p>
             <a:fld id="{6E31BD94-6558-4DB3-A27C-93E2C63AE737}" type="datetimeFigureOut">
               <a:rPr lang="en-US" smtClean="0"/>
-              <a:t>6/26/2019</a:t>
+              <a:t>6/27/2019</a:t>
             </a:fld>
             <a:endParaRPr lang="en-US"/>
           </a:p>
@@ -3341,7 +3341,7 @@
         <p:spPr>
           <a:xfrm>
             <a:off x="1260389" y="1721806"/>
-            <a:ext cx="1080000" cy="576000"/>
+            <a:ext cx="914400" cy="548640"/>
           </a:xfrm>
           <a:prstGeom prst="flowChartAlternateProcess">
             <a:avLst/>
@@ -3375,12 +3375,8 @@
           <a:p>
             <a:pPr algn="ctr"/>
             <a:r>
-              <a:rPr lang="en-US" sz="1200" dirty="0" smtClean="0"/>
-              <a:t>Input: </a:t>
-            </a:r>
-            <a:r>
               <a:rPr lang="en-US" sz="1200" dirty="0"/>
-              <a:t> </a:t>
+              <a:t>INPUT  </a:t>
             </a:r>
             <a:endParaRPr lang="en-US" sz="1200" dirty="0">
               <a:cs typeface="Calibri"/>
@@ -3390,7 +3386,7 @@
             <a:pPr algn="ctr"/>
             <a:r>
               <a:rPr lang="en-US" sz="1200" dirty="0"/>
-              <a:t>Slice Images</a:t>
+              <a:t>CT images</a:t>
             </a:r>
             <a:endParaRPr lang="en-US" sz="1200" dirty="0">
               <a:cs typeface="Calibri"/>
@@ -3400,10 +3396,10 @@
       </p:sp>
       <p:sp>
         <p:nvSpPr>
-          <p:cNvPr id="2" name="Arrow: Right 1">
-            <a:extLst>
-              <a:ext uri="{FF2B5EF4-FFF2-40B4-BE49-F238E27FC236}">
-                <a16:creationId xmlns:a16="http://schemas.microsoft.com/office/drawing/2014/main" id="{6E04BABE-8A1A-433B-9104-85728CD45FEE}"/>
+          <p:cNvPr id="3" name="Flowchart: Process 2">
+            <a:extLst>
+              <a:ext uri="{FF2B5EF4-FFF2-40B4-BE49-F238E27FC236}">
+                <a16:creationId xmlns:a16="http://schemas.microsoft.com/office/drawing/2014/main" id="{C62015C7-6955-445B-A9FB-70652405CBA8}"/>
               </a:ext>
             </a:extLst>
           </p:cNvPr>
@@ -3412,8 +3408,416 @@
         </p:nvSpPr>
         <p:spPr>
           <a:xfrm>
-            <a:off x="2338335" y="1941120"/>
-            <a:ext cx="288000" cy="144000"/>
+            <a:off x="2446994" y="1813246"/>
+            <a:ext cx="548640" cy="365760"/>
+          </a:xfrm>
+          <a:prstGeom prst="flowChartProcess">
+            <a:avLst/>
+          </a:prstGeom>
+          <a:solidFill>
+            <a:schemeClr val="accent5"/>
+          </a:solidFill>
+          <a:ln>
+            <a:noFill/>
+          </a:ln>
+        </p:spPr>
+        <p:style>
+          <a:lnRef idx="2">
+            <a:schemeClr val="accent1">
+              <a:shade val="50000"/>
+            </a:schemeClr>
+          </a:lnRef>
+          <a:fillRef idx="1">
+            <a:schemeClr val="accent1"/>
+          </a:fillRef>
+          <a:effectRef idx="0">
+            <a:schemeClr val="accent1"/>
+          </a:effectRef>
+          <a:fontRef idx="minor">
+            <a:schemeClr val="lt1"/>
+          </a:fontRef>
+        </p:style>
+        <p:txBody>
+          <a:bodyPr rtlCol="0" anchor="ctr"/>
+          <a:lstStyle/>
+          <a:p>
+            <a:pPr algn="ctr"/>
+            <a:r>
+              <a:rPr lang="en-US" sz="1200" dirty="0">
+                <a:cs typeface="Calibri"/>
+              </a:rPr>
+              <a:t>crop</a:t>
+            </a:r>
+          </a:p>
+        </p:txBody>
+      </p:sp>
+      <p:sp>
+        <p:nvSpPr>
+          <p:cNvPr id="19" name="Flowchart: Process 18">
+            <a:extLst>
+              <a:ext uri="{FF2B5EF4-FFF2-40B4-BE49-F238E27FC236}">
+                <a16:creationId xmlns:a16="http://schemas.microsoft.com/office/drawing/2014/main" id="{C62015C7-6955-445B-A9FB-70652405CBA8}"/>
+              </a:ext>
+            </a:extLst>
+          </p:cNvPr>
+          <p:cNvSpPr/>
+          <p:nvPr/>
+        </p:nvSpPr>
+        <p:spPr>
+          <a:xfrm>
+            <a:off x="3274771" y="1813246"/>
+            <a:ext cx="548640" cy="365760"/>
+          </a:xfrm>
+          <a:prstGeom prst="flowChartProcess">
+            <a:avLst/>
+          </a:prstGeom>
+          <a:solidFill>
+            <a:schemeClr val="accent5"/>
+          </a:solidFill>
+          <a:ln>
+            <a:noFill/>
+          </a:ln>
+        </p:spPr>
+        <p:style>
+          <a:lnRef idx="2">
+            <a:schemeClr val="accent1">
+              <a:shade val="50000"/>
+            </a:schemeClr>
+          </a:lnRef>
+          <a:fillRef idx="1">
+            <a:schemeClr val="accent1"/>
+          </a:fillRef>
+          <a:effectRef idx="0">
+            <a:schemeClr val="accent1"/>
+          </a:effectRef>
+          <a:fontRef idx="minor">
+            <a:schemeClr val="lt1"/>
+          </a:fontRef>
+        </p:style>
+        <p:txBody>
+          <a:bodyPr rtlCol="0" anchor="ctr"/>
+          <a:lstStyle/>
+          <a:p>
+            <a:pPr algn="ctr"/>
+            <a:r>
+              <a:rPr lang="en-US" sz="1200" dirty="0">
+                <a:cs typeface="Calibri"/>
+              </a:rPr>
+              <a:t>resize</a:t>
+            </a:r>
+          </a:p>
+        </p:txBody>
+      </p:sp>
+      <p:sp>
+        <p:nvSpPr>
+          <p:cNvPr id="20" name="Flowchart: Process 19">
+            <a:extLst>
+              <a:ext uri="{FF2B5EF4-FFF2-40B4-BE49-F238E27FC236}">
+                <a16:creationId xmlns:a16="http://schemas.microsoft.com/office/drawing/2014/main" id="{C62015C7-6955-445B-A9FB-70652405CBA8}"/>
+              </a:ext>
+            </a:extLst>
+          </p:cNvPr>
+          <p:cNvSpPr/>
+          <p:nvPr/>
+        </p:nvSpPr>
+        <p:spPr>
+          <a:xfrm>
+            <a:off x="4093274" y="1813246"/>
+            <a:ext cx="1097280" cy="365760"/>
+          </a:xfrm>
+          <a:prstGeom prst="flowChartProcess">
+            <a:avLst/>
+          </a:prstGeom>
+          <a:solidFill>
+            <a:schemeClr val="accent5"/>
+          </a:solidFill>
+          <a:ln>
+            <a:noFill/>
+          </a:ln>
+        </p:spPr>
+        <p:style>
+          <a:lnRef idx="2">
+            <a:schemeClr val="accent1">
+              <a:shade val="50000"/>
+            </a:schemeClr>
+          </a:lnRef>
+          <a:fillRef idx="1">
+            <a:schemeClr val="accent1"/>
+          </a:fillRef>
+          <a:effectRef idx="0">
+            <a:schemeClr val="accent1"/>
+          </a:effectRef>
+          <a:fontRef idx="minor">
+            <a:schemeClr val="lt1"/>
+          </a:fontRef>
+        </p:style>
+        <p:txBody>
+          <a:bodyPr rtlCol="0" anchor="ctr"/>
+          <a:lstStyle/>
+          <a:p>
+            <a:pPr algn="ctr"/>
+            <a:r>
+              <a:rPr lang="en-US" sz="1200" dirty="0">
+                <a:cs typeface="Calibri"/>
+              </a:rPr>
+              <a:t>random mirror</a:t>
+            </a:r>
+          </a:p>
+        </p:txBody>
+      </p:sp>
+      <p:sp>
+        <p:nvSpPr>
+          <p:cNvPr id="21" name="Flowchart: Alternate Process 20">
+            <a:extLst>
+              <a:ext uri="{FF2B5EF4-FFF2-40B4-BE49-F238E27FC236}">
+                <a16:creationId xmlns:a16="http://schemas.microsoft.com/office/drawing/2014/main" id="{318241BF-0420-4C0A-ADE8-8F3EB6397BCF}"/>
+              </a:ext>
+            </a:extLst>
+          </p:cNvPr>
+          <p:cNvSpPr/>
+          <p:nvPr/>
+        </p:nvSpPr>
+        <p:spPr>
+          <a:xfrm>
+            <a:off x="1260389" y="2717405"/>
+            <a:ext cx="914400" cy="548640"/>
+          </a:xfrm>
+          <a:prstGeom prst="flowChartAlternateProcess">
+            <a:avLst/>
+          </a:prstGeom>
+          <a:solidFill>
+            <a:schemeClr val="accent6"/>
+          </a:solidFill>
+          <a:ln>
+            <a:noFill/>
+          </a:ln>
+        </p:spPr>
+        <p:style>
+          <a:lnRef idx="2">
+            <a:schemeClr val="accent1">
+              <a:shade val="50000"/>
+            </a:schemeClr>
+          </a:lnRef>
+          <a:fillRef idx="1">
+            <a:schemeClr val="accent1"/>
+          </a:fillRef>
+          <a:effectRef idx="0">
+            <a:schemeClr val="accent1"/>
+          </a:effectRef>
+          <a:fontRef idx="minor">
+            <a:schemeClr val="lt1"/>
+          </a:fontRef>
+        </p:style>
+        <p:txBody>
+          <a:bodyPr rtlCol="0" anchor="ctr"/>
+          <a:lstStyle/>
+          <a:p>
+            <a:pPr algn="ctr"/>
+            <a:r>
+              <a:rPr lang="en-US" sz="1200" dirty="0"/>
+              <a:t>INPUT  </a:t>
+            </a:r>
+            <a:endParaRPr lang="en-US" sz="1200" dirty="0">
+              <a:cs typeface="Calibri"/>
+            </a:endParaRPr>
+          </a:p>
+          <a:p>
+            <a:pPr algn="ctr"/>
+            <a:r>
+              <a:rPr lang="en-US" sz="1200" dirty="0"/>
+              <a:t>ROI files</a:t>
+            </a:r>
+            <a:endParaRPr lang="en-US" sz="1200" dirty="0">
+              <a:cs typeface="Calibri"/>
+            </a:endParaRPr>
+          </a:p>
+        </p:txBody>
+      </p:sp>
+      <p:sp>
+        <p:nvSpPr>
+          <p:cNvPr id="22" name="Arrow: Right 1">
+            <a:extLst>
+              <a:ext uri="{FF2B5EF4-FFF2-40B4-BE49-F238E27FC236}">
+                <a16:creationId xmlns:a16="http://schemas.microsoft.com/office/drawing/2014/main" id="{6E04BABE-8A1A-433B-9104-85728CD45FEE}"/>
+              </a:ext>
+            </a:extLst>
+          </p:cNvPr>
+          <p:cNvSpPr/>
+          <p:nvPr/>
+        </p:nvSpPr>
+        <p:spPr>
+          <a:xfrm>
+            <a:off x="2172674" y="2923145"/>
+            <a:ext cx="274320" cy="137160"/>
+          </a:xfrm>
+          <a:prstGeom prst="rightArrow">
+            <a:avLst/>
+          </a:prstGeom>
+          <a:solidFill>
+            <a:schemeClr val="accent6">
+              <a:lumMod val="40000"/>
+              <a:lumOff val="60000"/>
+            </a:schemeClr>
+          </a:solidFill>
+          <a:ln>
+            <a:noFill/>
+          </a:ln>
+        </p:spPr>
+        <p:style>
+          <a:lnRef idx="2">
+            <a:schemeClr val="accent1">
+              <a:shade val="50000"/>
+            </a:schemeClr>
+          </a:lnRef>
+          <a:fillRef idx="1">
+            <a:schemeClr val="accent1"/>
+          </a:fillRef>
+          <a:effectRef idx="0">
+            <a:schemeClr val="accent1"/>
+          </a:effectRef>
+          <a:fontRef idx="minor">
+            <a:schemeClr val="lt1"/>
+          </a:fontRef>
+        </p:style>
+        <p:txBody>
+          <a:bodyPr rtlCol="0" anchor="ctr"/>
+          <a:lstStyle/>
+          <a:p>
+            <a:pPr algn="ctr"/>
+            <a:endParaRPr lang="en-US"/>
+          </a:p>
+        </p:txBody>
+      </p:sp>
+      <p:sp>
+        <p:nvSpPr>
+          <p:cNvPr id="23" name="Flowchart: Process 22">
+            <a:extLst>
+              <a:ext uri="{FF2B5EF4-FFF2-40B4-BE49-F238E27FC236}">
+                <a16:creationId xmlns:a16="http://schemas.microsoft.com/office/drawing/2014/main" id="{C62015C7-6955-445B-A9FB-70652405CBA8}"/>
+              </a:ext>
+            </a:extLst>
+          </p:cNvPr>
+          <p:cNvSpPr/>
+          <p:nvPr/>
+        </p:nvSpPr>
+        <p:spPr>
+          <a:xfrm>
+            <a:off x="2446994" y="2804257"/>
+            <a:ext cx="914400" cy="365760"/>
+          </a:xfrm>
+          <a:prstGeom prst="flowChartProcess">
+            <a:avLst/>
+          </a:prstGeom>
+          <a:solidFill>
+            <a:schemeClr val="accent6"/>
+          </a:solidFill>
+          <a:ln>
+            <a:noFill/>
+          </a:ln>
+        </p:spPr>
+        <p:style>
+          <a:lnRef idx="2">
+            <a:schemeClr val="accent1">
+              <a:shade val="50000"/>
+            </a:schemeClr>
+          </a:lnRef>
+          <a:fillRef idx="1">
+            <a:schemeClr val="accent1"/>
+          </a:fillRef>
+          <a:effectRef idx="0">
+            <a:schemeClr val="accent1"/>
+          </a:effectRef>
+          <a:fontRef idx="minor">
+            <a:schemeClr val="lt1"/>
+          </a:fontRef>
+        </p:style>
+        <p:txBody>
+          <a:bodyPr rtlCol="0" anchor="ctr"/>
+          <a:lstStyle/>
+          <a:p>
+            <a:pPr algn="ctr"/>
+            <a:r>
+              <a:rPr lang="en-US" sz="1200" dirty="0">
+                <a:cs typeface="Calibri"/>
+              </a:rPr>
+              <a:t>read data</a:t>
+            </a:r>
+          </a:p>
+        </p:txBody>
+      </p:sp>
+      <p:sp>
+        <p:nvSpPr>
+          <p:cNvPr id="26" name="Flowchart: Process 25">
+            <a:extLst>
+              <a:ext uri="{FF2B5EF4-FFF2-40B4-BE49-F238E27FC236}">
+                <a16:creationId xmlns:a16="http://schemas.microsoft.com/office/drawing/2014/main" id="{C62015C7-6955-445B-A9FB-70652405CBA8}"/>
+              </a:ext>
+            </a:extLst>
+          </p:cNvPr>
+          <p:cNvSpPr/>
+          <p:nvPr/>
+        </p:nvSpPr>
+        <p:spPr>
+          <a:xfrm>
+            <a:off x="3636838" y="2798639"/>
+            <a:ext cx="1463040" cy="365760"/>
+          </a:xfrm>
+          <a:prstGeom prst="flowChartProcess">
+            <a:avLst/>
+          </a:prstGeom>
+          <a:solidFill>
+            <a:schemeClr val="accent6"/>
+          </a:solidFill>
+          <a:ln>
+            <a:noFill/>
+          </a:ln>
+        </p:spPr>
+        <p:style>
+          <a:lnRef idx="2">
+            <a:schemeClr val="accent1">
+              <a:shade val="50000"/>
+            </a:schemeClr>
+          </a:lnRef>
+          <a:fillRef idx="1">
+            <a:schemeClr val="accent1"/>
+          </a:fillRef>
+          <a:effectRef idx="0">
+            <a:schemeClr val="accent1"/>
+          </a:effectRef>
+          <a:fontRef idx="minor">
+            <a:schemeClr val="lt1"/>
+          </a:fontRef>
+        </p:style>
+        <p:txBody>
+          <a:bodyPr rtlCol="0" anchor="ctr"/>
+          <a:lstStyle/>
+          <a:p>
+            <a:pPr algn="ctr"/>
+            <a:r>
+              <a:rPr lang="en-US" sz="1200" dirty="0">
+                <a:cs typeface="Calibri"/>
+              </a:rPr>
+              <a:t>convert coordinates</a:t>
+            </a:r>
+          </a:p>
+        </p:txBody>
+      </p:sp>
+      <p:sp>
+        <p:nvSpPr>
+          <p:cNvPr id="31" name="Arrow: Right 1">
+            <a:extLst>
+              <a:ext uri="{FF2B5EF4-FFF2-40B4-BE49-F238E27FC236}">
+                <a16:creationId xmlns:a16="http://schemas.microsoft.com/office/drawing/2014/main" id="{6E04BABE-8A1A-433B-9104-85728CD45FEE}"/>
+              </a:ext>
+            </a:extLst>
+          </p:cNvPr>
+          <p:cNvSpPr/>
+          <p:nvPr/>
+        </p:nvSpPr>
+        <p:spPr>
+          <a:xfrm>
+            <a:off x="3821421" y="1928312"/>
+            <a:ext cx="274320" cy="137160"/>
           </a:xfrm>
           <a:prstGeom prst="rightArrow">
             <a:avLst/>
@@ -3455,26 +3859,23 @@
       </p:sp>
       <p:sp>
         <p:nvSpPr>
-          <p:cNvPr id="3" name="Flowchart: Process 2">
-            <a:extLst>
-              <a:ext uri="{FF2B5EF4-FFF2-40B4-BE49-F238E27FC236}">
-                <a16:creationId xmlns:a16="http://schemas.microsoft.com/office/drawing/2014/main" id="{C62015C7-6955-445B-A9FB-70652405CBA8}"/>
-              </a:ext>
-            </a:extLst>
-          </p:cNvPr>
+          <p:cNvPr id="41" name="Bent-Up Arrow 40"/>
           <p:cNvSpPr/>
           <p:nvPr/>
         </p:nvSpPr>
         <p:spPr>
           <a:xfrm>
-            <a:off x="2617495" y="1793806"/>
-            <a:ext cx="792000" cy="432000"/>
+            <a:off x="5095422" y="2043487"/>
+            <a:ext cx="274319" cy="975430"/>
           </a:xfrm>
-          <a:prstGeom prst="flowChartProcess">
+          <a:prstGeom prst="bentUpArrow">
             <a:avLst/>
           </a:prstGeom>
           <a:solidFill>
-            <a:schemeClr val="accent5"/>
+            <a:schemeClr val="accent6">
+              <a:lumMod val="40000"/>
+              <a:lumOff val="60000"/>
+            </a:schemeClr>
           </a:solidFill>
           <a:ln>
             <a:noFill/>
@@ -3501,21 +3902,16 @@
           <a:lstStyle/>
           <a:p>
             <a:pPr algn="ctr"/>
-            <a:r>
-              <a:rPr lang="en-US" sz="1200">
-                <a:cs typeface="Calibri"/>
-              </a:rPr>
-              <a:t>Crop</a:t>
-            </a:r>
-          </a:p>
-        </p:txBody>
-      </p:sp>
-      <p:sp>
-        <p:nvSpPr>
-          <p:cNvPr id="19" name="Flowchart: Process 18">
-            <a:extLst>
-              <a:ext uri="{FF2B5EF4-FFF2-40B4-BE49-F238E27FC236}">
-                <a16:creationId xmlns:a16="http://schemas.microsoft.com/office/drawing/2014/main" id="{C62015C7-6955-445B-A9FB-70652405CBA8}"/>
+            <a:endParaRPr lang="en-CA"/>
+          </a:p>
+        </p:txBody>
+      </p:sp>
+      <p:sp>
+        <p:nvSpPr>
+          <p:cNvPr id="42" name="Flowchart: Alternate Process 41">
+            <a:extLst>
+              <a:ext uri="{FF2B5EF4-FFF2-40B4-BE49-F238E27FC236}">
+                <a16:creationId xmlns:a16="http://schemas.microsoft.com/office/drawing/2014/main" id="{318241BF-0420-4C0A-ADE8-8F3EB6397BCF}"/>
               </a:ext>
             </a:extLst>
           </p:cNvPr>
@@ -3524,14 +3920,14 @@
         </p:nvSpPr>
         <p:spPr>
           <a:xfrm>
-            <a:off x="3697495" y="1793806"/>
-            <a:ext cx="792000" cy="432000"/>
+            <a:off x="5739194" y="1447486"/>
+            <a:ext cx="914400" cy="1097280"/>
           </a:xfrm>
-          <a:prstGeom prst="flowChartProcess">
+          <a:prstGeom prst="flowChartAlternateProcess">
             <a:avLst/>
           </a:prstGeom>
           <a:solidFill>
-            <a:schemeClr val="accent5"/>
+            <a:schemeClr val="accent1"/>
           </a:solidFill>
           <a:ln>
             <a:noFill/>
@@ -3559,23 +3955,31 @@
           <a:p>
             <a:pPr algn="ctr"/>
             <a:r>
-              <a:rPr lang="en-US" sz="1200" dirty="0" smtClean="0">
-                <a:cs typeface="Calibri"/>
-              </a:rPr>
-              <a:t>Resize</a:t>
+              <a:rPr lang="en-US" sz="1200" dirty="0"/>
+              <a:t>OUTPUT </a:t>
             </a:r>
             <a:endParaRPr lang="en-US" sz="1200" dirty="0">
               <a:cs typeface="Calibri"/>
             </a:endParaRPr>
           </a:p>
-        </p:txBody>
-      </p:sp>
-      <p:sp>
-        <p:nvSpPr>
-          <p:cNvPr id="20" name="Flowchart: Process 19">
-            <a:extLst>
-              <a:ext uri="{FF2B5EF4-FFF2-40B4-BE49-F238E27FC236}">
-                <a16:creationId xmlns:a16="http://schemas.microsoft.com/office/drawing/2014/main" id="{C62015C7-6955-445B-A9FB-70652405CBA8}"/>
+          <a:p>
+            <a:pPr algn="ctr"/>
+            <a:r>
+              <a:rPr lang="en-US" sz="1200" dirty="0"/>
+              <a:t>matrix</a:t>
+            </a:r>
+            <a:endParaRPr lang="en-US" sz="1200" dirty="0">
+              <a:cs typeface="Calibri"/>
+            </a:endParaRPr>
+          </a:p>
+        </p:txBody>
+      </p:sp>
+      <p:sp>
+        <p:nvSpPr>
+          <p:cNvPr id="17" name="Arrow: Right 1">
+            <a:extLst>
+              <a:ext uri="{FF2B5EF4-FFF2-40B4-BE49-F238E27FC236}">
+                <a16:creationId xmlns:a16="http://schemas.microsoft.com/office/drawing/2014/main" id="{601FAC5C-6E8A-4019-BF86-9C0076A98A52}"/>
               </a:ext>
             </a:extLst>
           </p:cNvPr>
@@ -3584,14 +3988,17 @@
         </p:nvSpPr>
         <p:spPr>
           <a:xfrm>
-            <a:off x="4777495" y="1793806"/>
-            <a:ext cx="792000" cy="432000"/>
+            <a:off x="2173028" y="1928312"/>
+            <a:ext cx="274320" cy="137160"/>
           </a:xfrm>
-          <a:prstGeom prst="flowChartProcess">
+          <a:prstGeom prst="rightArrow">
             <a:avLst/>
           </a:prstGeom>
           <a:solidFill>
-            <a:schemeClr val="accent5"/>
+            <a:schemeClr val="accent5">
+              <a:lumMod val="40000"/>
+              <a:lumOff val="60000"/>
+            </a:schemeClr>
           </a:solidFill>
           <a:ln>
             <a:noFill/>
@@ -3618,24 +4025,16 @@
           <a:lstStyle/>
           <a:p>
             <a:pPr algn="ctr"/>
-            <a:r>
-              <a:rPr lang="en-US" sz="1200" dirty="0" smtClean="0">
-                <a:cs typeface="Calibri"/>
-              </a:rPr>
-              <a:t>Random mirror</a:t>
-            </a:r>
-            <a:endParaRPr lang="en-US" sz="1200" dirty="0">
-              <a:cs typeface="Calibri"/>
-            </a:endParaRPr>
-          </a:p>
-        </p:txBody>
-      </p:sp>
-      <p:sp>
-        <p:nvSpPr>
-          <p:cNvPr id="21" name="Flowchart: Alternate Process 20">
-            <a:extLst>
-              <a:ext uri="{FF2B5EF4-FFF2-40B4-BE49-F238E27FC236}">
-                <a16:creationId xmlns:a16="http://schemas.microsoft.com/office/drawing/2014/main" id="{318241BF-0420-4C0A-ADE8-8F3EB6397BCF}"/>
+            <a:endParaRPr lang="en-US"/>
+          </a:p>
+        </p:txBody>
+      </p:sp>
+      <p:sp>
+        <p:nvSpPr>
+          <p:cNvPr id="18" name="Arrow: Right 1">
+            <a:extLst>
+              <a:ext uri="{FF2B5EF4-FFF2-40B4-BE49-F238E27FC236}">
+                <a16:creationId xmlns:a16="http://schemas.microsoft.com/office/drawing/2014/main" id="{EA5453CD-4C8C-4E98-8436-703A6BAE2EA0}"/>
               </a:ext>
             </a:extLst>
           </p:cNvPr>
@@ -3644,14 +4043,17 @@
         </p:nvSpPr>
         <p:spPr>
           <a:xfrm>
-            <a:off x="1889249" y="2693307"/>
-            <a:ext cx="1080000" cy="576000"/>
+            <a:off x="3000928" y="1928312"/>
+            <a:ext cx="274320" cy="137160"/>
           </a:xfrm>
-          <a:prstGeom prst="flowChartAlternateProcess">
+          <a:prstGeom prst="rightArrow">
             <a:avLst/>
           </a:prstGeom>
           <a:solidFill>
-            <a:schemeClr val="accent6"/>
+            <a:schemeClr val="accent5">
+              <a:lumMod val="40000"/>
+              <a:lumOff val="60000"/>
+            </a:schemeClr>
           </a:solidFill>
           <a:ln>
             <a:noFill/>
@@ -3678,32 +4080,16 @@
           <a:lstStyle/>
           <a:p>
             <a:pPr algn="ctr"/>
-            <a:r>
-              <a:rPr lang="en-US" sz="1200" dirty="0"/>
-              <a:t>Input:  </a:t>
-            </a:r>
-            <a:endParaRPr lang="en-US" sz="1200" dirty="0">
-              <a:cs typeface="Calibri"/>
-            </a:endParaRPr>
-          </a:p>
-          <a:p>
-            <a:pPr algn="ctr"/>
-            <a:r>
-              <a:rPr lang="en-US" sz="1200" dirty="0" smtClean="0"/>
-              <a:t>ROI files</a:t>
-            </a:r>
-            <a:endParaRPr lang="en-US" sz="1200" dirty="0">
-              <a:cs typeface="Calibri"/>
-            </a:endParaRPr>
-          </a:p>
-        </p:txBody>
-      </p:sp>
-      <p:sp>
-        <p:nvSpPr>
-          <p:cNvPr id="22" name="Arrow: Right 1">
-            <a:extLst>
-              <a:ext uri="{FF2B5EF4-FFF2-40B4-BE49-F238E27FC236}">
-                <a16:creationId xmlns:a16="http://schemas.microsoft.com/office/drawing/2014/main" id="{6E04BABE-8A1A-433B-9104-85728CD45FEE}"/>
+            <a:endParaRPr lang="en-US"/>
+          </a:p>
+        </p:txBody>
+      </p:sp>
+      <p:sp>
+        <p:nvSpPr>
+          <p:cNvPr id="24" name="Arrow: Right 1">
+            <a:extLst>
+              <a:ext uri="{FF2B5EF4-FFF2-40B4-BE49-F238E27FC236}">
+                <a16:creationId xmlns:a16="http://schemas.microsoft.com/office/drawing/2014/main" id="{68DF2482-C898-42DD-9F53-AD381EB11C79}"/>
               </a:ext>
             </a:extLst>
           </p:cNvPr>
@@ -3712,8 +4098,63 @@
         </p:nvSpPr>
         <p:spPr>
           <a:xfrm>
-            <a:off x="2971133" y="2909307"/>
-            <a:ext cx="288000" cy="144000"/>
+            <a:off x="5190554" y="1928312"/>
+            <a:ext cx="548640" cy="137160"/>
+          </a:xfrm>
+          <a:prstGeom prst="rightArrow">
+            <a:avLst/>
+          </a:prstGeom>
+          <a:solidFill>
+            <a:schemeClr val="accent5">
+              <a:lumMod val="40000"/>
+              <a:lumOff val="60000"/>
+            </a:schemeClr>
+          </a:solidFill>
+          <a:ln>
+            <a:noFill/>
+          </a:ln>
+        </p:spPr>
+        <p:style>
+          <a:lnRef idx="2">
+            <a:schemeClr val="accent1">
+              <a:shade val="50000"/>
+            </a:schemeClr>
+          </a:lnRef>
+          <a:fillRef idx="1">
+            <a:schemeClr val="accent1"/>
+          </a:fillRef>
+          <a:effectRef idx="0">
+            <a:schemeClr val="accent1"/>
+          </a:effectRef>
+          <a:fontRef idx="minor">
+            <a:schemeClr val="lt1"/>
+          </a:fontRef>
+        </p:style>
+        <p:txBody>
+          <a:bodyPr rtlCol="0" anchor="ctr"/>
+          <a:lstStyle/>
+          <a:p>
+            <a:pPr algn="ctr"/>
+            <a:endParaRPr lang="en-US"/>
+          </a:p>
+        </p:txBody>
+      </p:sp>
+      <p:sp>
+        <p:nvSpPr>
+          <p:cNvPr id="25" name="Arrow: Right 1">
+            <a:extLst>
+              <a:ext uri="{FF2B5EF4-FFF2-40B4-BE49-F238E27FC236}">
+                <a16:creationId xmlns:a16="http://schemas.microsoft.com/office/drawing/2014/main" id="{FFE96CB2-5532-485D-81A0-24012376DCBC}"/>
+              </a:ext>
+            </a:extLst>
+          </p:cNvPr>
+          <p:cNvSpPr/>
+          <p:nvPr/>
+        </p:nvSpPr>
+        <p:spPr>
+          <a:xfrm>
+            <a:off x="3359279" y="2923145"/>
+            <a:ext cx="274320" cy="137160"/>
           </a:xfrm>
           <a:prstGeom prst="rightArrow">
             <a:avLst/>
@@ -3750,475 +4191,6 @@
           <a:p>
             <a:pPr algn="ctr"/>
             <a:endParaRPr lang="en-US"/>
-          </a:p>
-        </p:txBody>
-      </p:sp>
-      <p:sp>
-        <p:nvSpPr>
-          <p:cNvPr id="23" name="Flowchart: Process 22">
-            <a:extLst>
-              <a:ext uri="{FF2B5EF4-FFF2-40B4-BE49-F238E27FC236}">
-                <a16:creationId xmlns:a16="http://schemas.microsoft.com/office/drawing/2014/main" id="{C62015C7-6955-445B-A9FB-70652405CBA8}"/>
-              </a:ext>
-            </a:extLst>
-          </p:cNvPr>
-          <p:cNvSpPr/>
-          <p:nvPr/>
-        </p:nvSpPr>
-        <p:spPr>
-          <a:xfrm>
-            <a:off x="3262901" y="2765307"/>
-            <a:ext cx="1008000" cy="432000"/>
-          </a:xfrm>
-          <a:prstGeom prst="flowChartProcess">
-            <a:avLst/>
-          </a:prstGeom>
-          <a:solidFill>
-            <a:schemeClr val="accent6"/>
-          </a:solidFill>
-          <a:ln>
-            <a:noFill/>
-          </a:ln>
-        </p:spPr>
-        <p:style>
-          <a:lnRef idx="2">
-            <a:schemeClr val="accent1">
-              <a:shade val="50000"/>
-            </a:schemeClr>
-          </a:lnRef>
-          <a:fillRef idx="1">
-            <a:schemeClr val="accent1"/>
-          </a:fillRef>
-          <a:effectRef idx="0">
-            <a:schemeClr val="accent1"/>
-          </a:effectRef>
-          <a:fontRef idx="minor">
-            <a:schemeClr val="lt1"/>
-          </a:fontRef>
-        </p:style>
-        <p:txBody>
-          <a:bodyPr rtlCol="0" anchor="ctr"/>
-          <a:lstStyle/>
-          <a:p>
-            <a:pPr algn="ctr"/>
-            <a:r>
-              <a:rPr lang="en-US" sz="1200" dirty="0" smtClean="0">
-                <a:cs typeface="Calibri"/>
-              </a:rPr>
-              <a:t>Read data</a:t>
-            </a:r>
-            <a:endParaRPr lang="en-US" sz="1200" dirty="0">
-              <a:cs typeface="Calibri"/>
-            </a:endParaRPr>
-          </a:p>
-        </p:txBody>
-      </p:sp>
-      <p:sp>
-        <p:nvSpPr>
-          <p:cNvPr id="26" name="Flowchart: Process 25">
-            <a:extLst>
-              <a:ext uri="{FF2B5EF4-FFF2-40B4-BE49-F238E27FC236}">
-                <a16:creationId xmlns:a16="http://schemas.microsoft.com/office/drawing/2014/main" id="{C62015C7-6955-445B-A9FB-70652405CBA8}"/>
-              </a:ext>
-            </a:extLst>
-          </p:cNvPr>
-          <p:cNvSpPr/>
-          <p:nvPr/>
-        </p:nvSpPr>
-        <p:spPr>
-          <a:xfrm>
-            <a:off x="4555133" y="2765307"/>
-            <a:ext cx="1008000" cy="432000"/>
-          </a:xfrm>
-          <a:prstGeom prst="flowChartProcess">
-            <a:avLst/>
-          </a:prstGeom>
-          <a:solidFill>
-            <a:schemeClr val="accent6"/>
-          </a:solidFill>
-          <a:ln>
-            <a:noFill/>
-          </a:ln>
-        </p:spPr>
-        <p:style>
-          <a:lnRef idx="2">
-            <a:schemeClr val="accent1">
-              <a:shade val="50000"/>
-            </a:schemeClr>
-          </a:lnRef>
-          <a:fillRef idx="1">
-            <a:schemeClr val="accent1"/>
-          </a:fillRef>
-          <a:effectRef idx="0">
-            <a:schemeClr val="accent1"/>
-          </a:effectRef>
-          <a:fontRef idx="minor">
-            <a:schemeClr val="lt1"/>
-          </a:fontRef>
-        </p:style>
-        <p:txBody>
-          <a:bodyPr rtlCol="0" anchor="ctr"/>
-          <a:lstStyle/>
-          <a:p>
-            <a:pPr algn="ctr"/>
-            <a:r>
-              <a:rPr lang="en-US" sz="1200" dirty="0" smtClean="0">
-                <a:cs typeface="Calibri"/>
-              </a:rPr>
-              <a:t>Convert coordinates</a:t>
-            </a:r>
-            <a:endParaRPr lang="en-US" sz="1200" dirty="0">
-              <a:cs typeface="Calibri"/>
-            </a:endParaRPr>
-          </a:p>
-        </p:txBody>
-      </p:sp>
-      <p:sp>
-        <p:nvSpPr>
-          <p:cNvPr id="30" name="Arrow: Right 1">
-            <a:extLst>
-              <a:ext uri="{FF2B5EF4-FFF2-40B4-BE49-F238E27FC236}">
-                <a16:creationId xmlns:a16="http://schemas.microsoft.com/office/drawing/2014/main" id="{6E04BABE-8A1A-433B-9104-85728CD45FEE}"/>
-              </a:ext>
-            </a:extLst>
-          </p:cNvPr>
-          <p:cNvSpPr/>
-          <p:nvPr/>
-        </p:nvSpPr>
-        <p:spPr>
-          <a:xfrm>
-            <a:off x="3409495" y="1937806"/>
-            <a:ext cx="288000" cy="144000"/>
-          </a:xfrm>
-          <a:prstGeom prst="rightArrow">
-            <a:avLst/>
-          </a:prstGeom>
-          <a:solidFill>
-            <a:schemeClr val="accent5">
-              <a:lumMod val="40000"/>
-              <a:lumOff val="60000"/>
-            </a:schemeClr>
-          </a:solidFill>
-          <a:ln>
-            <a:noFill/>
-          </a:ln>
-        </p:spPr>
-        <p:style>
-          <a:lnRef idx="2">
-            <a:schemeClr val="accent1">
-              <a:shade val="50000"/>
-            </a:schemeClr>
-          </a:lnRef>
-          <a:fillRef idx="1">
-            <a:schemeClr val="accent1"/>
-          </a:fillRef>
-          <a:effectRef idx="0">
-            <a:schemeClr val="accent1"/>
-          </a:effectRef>
-          <a:fontRef idx="minor">
-            <a:schemeClr val="lt1"/>
-          </a:fontRef>
-        </p:style>
-        <p:txBody>
-          <a:bodyPr rtlCol="0" anchor="ctr"/>
-          <a:lstStyle/>
-          <a:p>
-            <a:pPr algn="ctr"/>
-            <a:endParaRPr lang="en-US"/>
-          </a:p>
-        </p:txBody>
-      </p:sp>
-      <p:sp>
-        <p:nvSpPr>
-          <p:cNvPr id="31" name="Arrow: Right 1">
-            <a:extLst>
-              <a:ext uri="{FF2B5EF4-FFF2-40B4-BE49-F238E27FC236}">
-                <a16:creationId xmlns:a16="http://schemas.microsoft.com/office/drawing/2014/main" id="{6E04BABE-8A1A-433B-9104-85728CD45FEE}"/>
-              </a:ext>
-            </a:extLst>
-          </p:cNvPr>
-          <p:cNvSpPr/>
-          <p:nvPr/>
-        </p:nvSpPr>
-        <p:spPr>
-          <a:xfrm>
-            <a:off x="4489495" y="1937806"/>
-            <a:ext cx="288000" cy="144000"/>
-          </a:xfrm>
-          <a:prstGeom prst="rightArrow">
-            <a:avLst/>
-          </a:prstGeom>
-          <a:solidFill>
-            <a:schemeClr val="accent5">
-              <a:lumMod val="40000"/>
-              <a:lumOff val="60000"/>
-            </a:schemeClr>
-          </a:solidFill>
-          <a:ln>
-            <a:noFill/>
-          </a:ln>
-        </p:spPr>
-        <p:style>
-          <a:lnRef idx="2">
-            <a:schemeClr val="accent1">
-              <a:shade val="50000"/>
-            </a:schemeClr>
-          </a:lnRef>
-          <a:fillRef idx="1">
-            <a:schemeClr val="accent1"/>
-          </a:fillRef>
-          <a:effectRef idx="0">
-            <a:schemeClr val="accent1"/>
-          </a:effectRef>
-          <a:fontRef idx="minor">
-            <a:schemeClr val="lt1"/>
-          </a:fontRef>
-        </p:style>
-        <p:txBody>
-          <a:bodyPr rtlCol="0" anchor="ctr"/>
-          <a:lstStyle/>
-          <a:p>
-            <a:pPr algn="ctr"/>
-            <a:endParaRPr lang="en-US"/>
-          </a:p>
-        </p:txBody>
-      </p:sp>
-      <p:sp>
-        <p:nvSpPr>
-          <p:cNvPr id="32" name="Arrow: Right 1">
-            <a:extLst>
-              <a:ext uri="{FF2B5EF4-FFF2-40B4-BE49-F238E27FC236}">
-                <a16:creationId xmlns:a16="http://schemas.microsoft.com/office/drawing/2014/main" id="{6E04BABE-8A1A-433B-9104-85728CD45FEE}"/>
-              </a:ext>
-            </a:extLst>
-          </p:cNvPr>
-          <p:cNvSpPr/>
-          <p:nvPr/>
-        </p:nvSpPr>
-        <p:spPr>
-          <a:xfrm>
-            <a:off x="4267133" y="2909307"/>
-            <a:ext cx="288000" cy="144000"/>
-          </a:xfrm>
-          <a:prstGeom prst="rightArrow">
-            <a:avLst/>
-          </a:prstGeom>
-          <a:solidFill>
-            <a:schemeClr val="accent6">
-              <a:lumMod val="40000"/>
-              <a:lumOff val="60000"/>
-            </a:schemeClr>
-          </a:solidFill>
-          <a:ln>
-            <a:noFill/>
-          </a:ln>
-        </p:spPr>
-        <p:style>
-          <a:lnRef idx="2">
-            <a:schemeClr val="accent1">
-              <a:shade val="50000"/>
-            </a:schemeClr>
-          </a:lnRef>
-          <a:fillRef idx="1">
-            <a:schemeClr val="accent1"/>
-          </a:fillRef>
-          <a:effectRef idx="0">
-            <a:schemeClr val="accent1"/>
-          </a:effectRef>
-          <a:fontRef idx="minor">
-            <a:schemeClr val="lt1"/>
-          </a:fontRef>
-        </p:style>
-        <p:txBody>
-          <a:bodyPr rtlCol="0" anchor="ctr"/>
-          <a:lstStyle/>
-          <a:p>
-            <a:pPr algn="ctr"/>
-            <a:endParaRPr lang="en-US"/>
-          </a:p>
-        </p:txBody>
-      </p:sp>
-      <p:sp>
-        <p:nvSpPr>
-          <p:cNvPr id="33" name="Arrow: Right 1">
-            <a:extLst>
-              <a:ext uri="{FF2B5EF4-FFF2-40B4-BE49-F238E27FC236}">
-                <a16:creationId xmlns:a16="http://schemas.microsoft.com/office/drawing/2014/main" id="{6E04BABE-8A1A-433B-9104-85728CD45FEE}"/>
-              </a:ext>
-            </a:extLst>
-          </p:cNvPr>
-          <p:cNvSpPr/>
-          <p:nvPr/>
-        </p:nvSpPr>
-        <p:spPr>
-          <a:xfrm>
-            <a:off x="5569495" y="1937806"/>
-            <a:ext cx="360000" cy="144000"/>
-          </a:xfrm>
-          <a:prstGeom prst="rightArrow">
-            <a:avLst/>
-          </a:prstGeom>
-          <a:solidFill>
-            <a:schemeClr val="accent5">
-              <a:lumMod val="40000"/>
-              <a:lumOff val="60000"/>
-            </a:schemeClr>
-          </a:solidFill>
-          <a:ln>
-            <a:noFill/>
-          </a:ln>
-        </p:spPr>
-        <p:style>
-          <a:lnRef idx="2">
-            <a:schemeClr val="accent1">
-              <a:shade val="50000"/>
-            </a:schemeClr>
-          </a:lnRef>
-          <a:fillRef idx="1">
-            <a:schemeClr val="accent1"/>
-          </a:fillRef>
-          <a:effectRef idx="0">
-            <a:schemeClr val="accent1"/>
-          </a:effectRef>
-          <a:fontRef idx="minor">
-            <a:schemeClr val="lt1"/>
-          </a:fontRef>
-        </p:style>
-        <p:txBody>
-          <a:bodyPr rtlCol="0" anchor="ctr"/>
-          <a:lstStyle/>
-          <a:p>
-            <a:pPr algn="ctr"/>
-            <a:endParaRPr lang="en-US"/>
-          </a:p>
-        </p:txBody>
-      </p:sp>
-      <p:sp>
-        <p:nvSpPr>
-          <p:cNvPr id="41" name="Bent-Up Arrow 40"/>
-          <p:cNvSpPr/>
-          <p:nvPr/>
-        </p:nvSpPr>
-        <p:spPr>
-          <a:xfrm>
-            <a:off x="5560127" y="2029975"/>
-            <a:ext cx="238558" cy="975430"/>
-          </a:xfrm>
-          <a:prstGeom prst="bentUpArrow">
-            <a:avLst/>
-          </a:prstGeom>
-          <a:solidFill>
-            <a:schemeClr val="accent6">
-              <a:lumMod val="40000"/>
-              <a:lumOff val="60000"/>
-            </a:schemeClr>
-          </a:solidFill>
-          <a:ln>
-            <a:noFill/>
-          </a:ln>
-        </p:spPr>
-        <p:style>
-          <a:lnRef idx="2">
-            <a:schemeClr val="accent1">
-              <a:shade val="50000"/>
-            </a:schemeClr>
-          </a:lnRef>
-          <a:fillRef idx="1">
-            <a:schemeClr val="accent1"/>
-          </a:fillRef>
-          <a:effectRef idx="0">
-            <a:schemeClr val="accent1"/>
-          </a:effectRef>
-          <a:fontRef idx="minor">
-            <a:schemeClr val="lt1"/>
-          </a:fontRef>
-        </p:style>
-        <p:txBody>
-          <a:bodyPr rtlCol="0" anchor="ctr"/>
-          <a:lstStyle/>
-          <a:p>
-            <a:pPr algn="ctr"/>
-            <a:endParaRPr lang="en-CA"/>
-          </a:p>
-        </p:txBody>
-      </p:sp>
-      <p:sp>
-        <p:nvSpPr>
-          <p:cNvPr id="42" name="Flowchart: Alternate Process 41">
-            <a:extLst>
-              <a:ext uri="{FF2B5EF4-FFF2-40B4-BE49-F238E27FC236}">
-                <a16:creationId xmlns:a16="http://schemas.microsoft.com/office/drawing/2014/main" id="{318241BF-0420-4C0A-ADE8-8F3EB6397BCF}"/>
-              </a:ext>
-            </a:extLst>
-          </p:cNvPr>
-          <p:cNvSpPr/>
-          <p:nvPr/>
-        </p:nvSpPr>
-        <p:spPr>
-          <a:xfrm>
-            <a:off x="5927904" y="1721806"/>
-            <a:ext cx="900000" cy="971502"/>
-          </a:xfrm>
-          <a:prstGeom prst="flowChartAlternateProcess">
-            <a:avLst/>
-          </a:prstGeom>
-          <a:solidFill>
-            <a:schemeClr val="accent1"/>
-          </a:solidFill>
-          <a:ln>
-            <a:noFill/>
-          </a:ln>
-        </p:spPr>
-        <p:style>
-          <a:lnRef idx="2">
-            <a:schemeClr val="accent1">
-              <a:shade val="50000"/>
-            </a:schemeClr>
-          </a:lnRef>
-          <a:fillRef idx="1">
-            <a:schemeClr val="accent1"/>
-          </a:fillRef>
-          <a:effectRef idx="0">
-            <a:schemeClr val="accent1"/>
-          </a:effectRef>
-          <a:fontRef idx="minor">
-            <a:schemeClr val="lt1"/>
-          </a:fontRef>
-        </p:style>
-        <p:txBody>
-          <a:bodyPr rtlCol="0" anchor="ctr"/>
-          <a:lstStyle/>
-          <a:p>
-            <a:pPr algn="ctr"/>
-            <a:r>
-              <a:rPr lang="en-US" sz="1200" dirty="0" smtClean="0"/>
-              <a:t>Output</a:t>
-            </a:r>
-            <a:r>
-              <a:rPr lang="en-US" sz="1200" dirty="0"/>
-              <a:t>:</a:t>
-            </a:r>
-            <a:r>
-              <a:rPr lang="en-US" sz="1200" dirty="0"/>
-              <a:t> </a:t>
-            </a:r>
-            <a:endParaRPr lang="en-US" sz="1200" dirty="0">
-              <a:cs typeface="Calibri"/>
-            </a:endParaRPr>
-          </a:p>
-          <a:p>
-            <a:pPr algn="ctr"/>
-            <a:r>
-              <a:rPr lang="en-US" sz="1200" dirty="0" err="1" smtClean="0"/>
-              <a:t>Numpy</a:t>
-            </a:r>
-            <a:r>
-              <a:rPr lang="en-US" sz="1200" dirty="0" smtClean="0"/>
-              <a:t> Matrix</a:t>
-            </a:r>
-            <a:endParaRPr lang="en-US" sz="1200" dirty="0">
-              <a:cs typeface="Calibri"/>
-            </a:endParaRPr>
           </a:p>
         </p:txBody>
       </p:sp>

</xml_diff>